<commit_message>
Further updates to Poster
</commit_message>
<xml_diff>
--- a/product documents/Poster.pptx
+++ b/product documents/Poster.pptx
@@ -1162,7 +1162,7 @@
               <a:latin typeface="Source Serif Pro" panose="02040603050405020204" pitchFamily="18" charset="0"/>
               <a:ea typeface="Source Serif Pro" panose="02040603050405020204" pitchFamily="18" charset="0"/>
             </a:rPr>
-            <a:t>Climb the Leader board</a:t>
+            <a:t>Climb the Leaderboard</a:t>
           </a:r>
         </a:p>
       </dgm:t>
@@ -1299,7 +1299,7 @@
               <a:latin typeface="Source Serif Pro ExtraLight" panose="02040203050405020204" pitchFamily="18" charset="0"/>
               <a:ea typeface="Source Serif Pro ExtraLight" panose="02040203050405020204" pitchFamily="18" charset="0"/>
             </a:rPr>
-            <a:t>View peoples profile.</a:t>
+            <a:t>View peoples profiles.</a:t>
           </a:r>
         </a:p>
       </dgm:t>
@@ -1528,8 +1528,8 @@
       </dsp:nvSpPr>
       <dsp:spPr>
         <a:xfrm rot="5400000">
-          <a:off x="11896276" y="-4541437"/>
-          <a:ext cx="2692064" cy="12463349"/>
+          <a:off x="8685281" y="-3218273"/>
+          <a:ext cx="2213437" cy="9216000"/>
         </a:xfrm>
         <a:prstGeom prst="round2SameRect">
           <a:avLst/>
@@ -1555,12 +1555,12 @@
         <a:fontRef idx="minor"/>
       </dsp:style>
       <dsp:txBody>
-        <a:bodyPr spcFirstLastPara="0" vert="horz" wrap="square" lIns="247650" tIns="123825" rIns="247650" bIns="123825" numCol="1" spcCol="1270" anchor="ctr" anchorCtr="0">
+        <a:bodyPr spcFirstLastPara="0" vert="horz" wrap="square" lIns="228600" tIns="114300" rIns="228600" bIns="114300" numCol="1" spcCol="1270" anchor="ctr" anchorCtr="0">
           <a:noAutofit/>
         </a:bodyPr>
         <a:lstStyle/>
         <a:p>
-          <a:pPr marL="285750" lvl="1" indent="-285750" algn="ctr" defTabSz="2889250">
+          <a:pPr marL="285750" lvl="1" indent="-285750" algn="ctr" defTabSz="2667000">
             <a:lnSpc>
               <a:spcPct val="90000"/>
             </a:lnSpc>
@@ -1573,7 +1573,7 @@
             <a:buNone/>
           </a:pPr>
           <a:r>
-            <a:rPr lang="en-GB" sz="6500" kern="1200" dirty="0">
+            <a:rPr lang="en-GB" sz="6000" kern="1200" dirty="0">
               <a:latin typeface="Source Serif Pro ExtraLight" panose="02040203050405020204" pitchFamily="18" charset="0"/>
               <a:ea typeface="Source Serif Pro ExtraLight" panose="02040203050405020204" pitchFamily="18" charset="0"/>
             </a:rPr>
@@ -1582,8 +1582,8 @@
         </a:p>
       </dsp:txBody>
       <dsp:txXfrm rot="-5400000">
-        <a:off x="7010634" y="475621"/>
-        <a:ext cx="12331933" cy="2429232"/>
+        <a:off x="5184000" y="391059"/>
+        <a:ext cx="9107949" cy="1997335"/>
       </dsp:txXfrm>
     </dsp:sp>
     <dsp:sp modelId="{DFB4A00C-36B7-401A-9617-1C6E09996FCD}">
@@ -1593,8 +1593,8 @@
       </dsp:nvSpPr>
       <dsp:spPr>
         <a:xfrm>
-          <a:off x="0" y="7696"/>
-          <a:ext cx="7010633" cy="3365080"/>
+          <a:off x="0" y="6328"/>
+          <a:ext cx="5184000" cy="2766796"/>
         </a:xfrm>
         <a:prstGeom prst="roundRect">
           <a:avLst/>
@@ -1631,12 +1631,12 @@
         </a:fontRef>
       </dsp:style>
       <dsp:txBody>
-        <a:bodyPr spcFirstLastPara="0" vert="horz" wrap="square" lIns="247650" tIns="123825" rIns="247650" bIns="123825" numCol="1" spcCol="1270" anchor="ctr" anchorCtr="0">
+        <a:bodyPr spcFirstLastPara="0" vert="horz" wrap="square" lIns="220980" tIns="110490" rIns="220980" bIns="110490" numCol="1" spcCol="1270" anchor="ctr" anchorCtr="0">
           <a:noAutofit/>
         </a:bodyPr>
         <a:lstStyle/>
         <a:p>
-          <a:pPr marL="0" lvl="0" indent="0" algn="ctr" defTabSz="2889250">
+          <a:pPr marL="0" lvl="0" indent="0" algn="ctr" defTabSz="2578100">
             <a:lnSpc>
               <a:spcPct val="90000"/>
             </a:lnSpc>
@@ -1649,7 +1649,7 @@
             <a:buNone/>
           </a:pPr>
           <a:r>
-            <a:rPr lang="en-GB" sz="6500" kern="1200" dirty="0">
+            <a:rPr lang="en-GB" sz="5800" kern="1200" dirty="0">
               <a:latin typeface="Source Serif Pro" panose="02040603050405020204" pitchFamily="18" charset="0"/>
               <a:ea typeface="Source Serif Pro" panose="02040603050405020204" pitchFamily="18" charset="0"/>
             </a:rPr>
@@ -1658,8 +1658,8 @@
         </a:p>
       </dsp:txBody>
       <dsp:txXfrm>
-        <a:off x="164270" y="171966"/>
-        <a:ext cx="6682093" cy="3036540"/>
+        <a:off x="135064" y="141392"/>
+        <a:ext cx="4913872" cy="2496668"/>
       </dsp:txXfrm>
     </dsp:sp>
     <dsp:sp modelId="{B96D5C01-E04F-4892-A828-4E11B2CFF2E1}">
@@ -1669,8 +1669,8 @@
       </dsp:nvSpPr>
       <dsp:spPr>
         <a:xfrm rot="5400000">
-          <a:off x="11896276" y="-1008102"/>
-          <a:ext cx="2692064" cy="12463349"/>
+          <a:off x="8685281" y="-313137"/>
+          <a:ext cx="2213437" cy="9216000"/>
         </a:xfrm>
         <a:prstGeom prst="round2SameRect">
           <a:avLst/>
@@ -1696,12 +1696,12 @@
         <a:fontRef idx="minor"/>
       </dsp:style>
       <dsp:txBody>
-        <a:bodyPr spcFirstLastPara="0" vert="horz" wrap="square" lIns="247650" tIns="123825" rIns="247650" bIns="123825" numCol="1" spcCol="1270" anchor="ctr" anchorCtr="0">
+        <a:bodyPr spcFirstLastPara="0" vert="horz" wrap="square" lIns="228600" tIns="114300" rIns="228600" bIns="114300" numCol="1" spcCol="1270" anchor="ctr" anchorCtr="0">
           <a:noAutofit/>
         </a:bodyPr>
         <a:lstStyle/>
         <a:p>
-          <a:pPr marL="285750" lvl="1" indent="-285750" algn="ctr" defTabSz="2889250">
+          <a:pPr marL="285750" lvl="1" indent="-285750" algn="ctr" defTabSz="2667000">
             <a:lnSpc>
               <a:spcPct val="90000"/>
             </a:lnSpc>
@@ -1714,7 +1714,7 @@
             <a:buNone/>
           </a:pPr>
           <a:r>
-            <a:rPr lang="en-GB" sz="6500" kern="1200" dirty="0">
+            <a:rPr lang="en-GB" sz="6000" kern="1200" dirty="0">
               <a:latin typeface="Source Serif Pro ExtraLight" panose="02040203050405020204" pitchFamily="18" charset="0"/>
               <a:ea typeface="Source Serif Pro ExtraLight" panose="02040203050405020204" pitchFamily="18" charset="0"/>
             </a:rPr>
@@ -1723,8 +1723,8 @@
         </a:p>
       </dsp:txBody>
       <dsp:txXfrm rot="-5400000">
-        <a:off x="7010634" y="4008956"/>
-        <a:ext cx="12331933" cy="2429232"/>
+        <a:off x="5184000" y="3296195"/>
+        <a:ext cx="9107949" cy="1997335"/>
       </dsp:txXfrm>
     </dsp:sp>
     <dsp:sp modelId="{19CF64B8-4812-424C-8FC9-C5B7E97177A2}">
@@ -1734,8 +1734,8 @@
       </dsp:nvSpPr>
       <dsp:spPr>
         <a:xfrm>
-          <a:off x="0" y="3541031"/>
-          <a:ext cx="7010633" cy="3365080"/>
+          <a:off x="0" y="2911464"/>
+          <a:ext cx="5184000" cy="2766796"/>
         </a:xfrm>
         <a:prstGeom prst="roundRect">
           <a:avLst/>
@@ -1772,12 +1772,12 @@
         </a:fontRef>
       </dsp:style>
       <dsp:txBody>
-        <a:bodyPr spcFirstLastPara="0" vert="horz" wrap="square" lIns="247650" tIns="123825" rIns="247650" bIns="123825" numCol="1" spcCol="1270" anchor="ctr" anchorCtr="0">
+        <a:bodyPr spcFirstLastPara="0" vert="horz" wrap="square" lIns="220980" tIns="110490" rIns="220980" bIns="110490" numCol="1" spcCol="1270" anchor="ctr" anchorCtr="0">
           <a:noAutofit/>
         </a:bodyPr>
         <a:lstStyle/>
         <a:p>
-          <a:pPr marL="0" lvl="0" indent="0" algn="ctr" defTabSz="2889250">
+          <a:pPr marL="0" lvl="0" indent="0" algn="ctr" defTabSz="2578100">
             <a:lnSpc>
               <a:spcPct val="90000"/>
             </a:lnSpc>
@@ -1790,7 +1790,7 @@
             <a:buNone/>
           </a:pPr>
           <a:r>
-            <a:rPr lang="en-GB" sz="6500" kern="1200" dirty="0">
+            <a:rPr lang="en-GB" sz="5800" kern="1200" dirty="0">
               <a:latin typeface="Source Serif Pro" panose="02040603050405020204" pitchFamily="18" charset="0"/>
               <a:ea typeface="Source Serif Pro" panose="02040603050405020204" pitchFamily="18" charset="0"/>
             </a:rPr>
@@ -1799,8 +1799,8 @@
         </a:p>
       </dsp:txBody>
       <dsp:txXfrm>
-        <a:off x="164270" y="3705301"/>
-        <a:ext cx="6682093" cy="3036540"/>
+        <a:off x="135064" y="3046528"/>
+        <a:ext cx="4913872" cy="2496668"/>
       </dsp:txXfrm>
     </dsp:sp>
     <dsp:sp modelId="{5CEF5D08-58D9-4872-8584-35E9EF7975AD}">
@@ -1810,8 +1810,8 @@
       </dsp:nvSpPr>
       <dsp:spPr>
         <a:xfrm rot="5400000">
-          <a:off x="11896276" y="2525232"/>
-          <a:ext cx="2692064" cy="12463349"/>
+          <a:off x="8685281" y="2591999"/>
+          <a:ext cx="2213437" cy="9216000"/>
         </a:xfrm>
         <a:prstGeom prst="round2SameRect">
           <a:avLst/>
@@ -1837,12 +1837,12 @@
         <a:fontRef idx="minor"/>
       </dsp:style>
       <dsp:txBody>
-        <a:bodyPr spcFirstLastPara="0" vert="horz" wrap="square" lIns="247650" tIns="123825" rIns="247650" bIns="123825" numCol="1" spcCol="1270" anchor="ctr" anchorCtr="0">
+        <a:bodyPr spcFirstLastPara="0" vert="horz" wrap="square" lIns="228600" tIns="114300" rIns="228600" bIns="114300" numCol="1" spcCol="1270" anchor="ctr" anchorCtr="0">
           <a:noAutofit/>
         </a:bodyPr>
         <a:lstStyle/>
         <a:p>
-          <a:pPr marL="285750" lvl="1" indent="-285750" algn="ctr" defTabSz="2889250">
+          <a:pPr marL="285750" lvl="1" indent="-285750" algn="ctr" defTabSz="2667000">
             <a:lnSpc>
               <a:spcPct val="90000"/>
             </a:lnSpc>
@@ -1855,7 +1855,7 @@
             <a:buNone/>
           </a:pPr>
           <a:r>
-            <a:rPr lang="en-GB" sz="6500" kern="1200" dirty="0">
+            <a:rPr lang="en-GB" sz="6000" kern="1200" dirty="0">
               <a:latin typeface="Source Serif Pro ExtraLight" panose="02040203050405020204" pitchFamily="18" charset="0"/>
               <a:ea typeface="Source Serif Pro ExtraLight" panose="02040203050405020204" pitchFamily="18" charset="0"/>
             </a:rPr>
@@ -1864,8 +1864,8 @@
         </a:p>
       </dsp:txBody>
       <dsp:txXfrm rot="-5400000">
-        <a:off x="7010634" y="7542290"/>
-        <a:ext cx="12331933" cy="2429232"/>
+        <a:off x="5184000" y="6201332"/>
+        <a:ext cx="9107949" cy="1997335"/>
       </dsp:txXfrm>
     </dsp:sp>
     <dsp:sp modelId="{57D5B4E1-1BA8-4CF3-9FFC-D7AE5CE8C0AA}">
@@ -1875,8 +1875,8 @@
       </dsp:nvSpPr>
       <dsp:spPr>
         <a:xfrm>
-          <a:off x="0" y="7074366"/>
-          <a:ext cx="7010633" cy="3365080"/>
+          <a:off x="0" y="5816601"/>
+          <a:ext cx="5184000" cy="2766796"/>
         </a:xfrm>
         <a:prstGeom prst="roundRect">
           <a:avLst/>
@@ -1913,12 +1913,12 @@
         </a:fontRef>
       </dsp:style>
       <dsp:txBody>
-        <a:bodyPr spcFirstLastPara="0" vert="horz" wrap="square" lIns="247650" tIns="123825" rIns="247650" bIns="123825" numCol="1" spcCol="1270" anchor="ctr" anchorCtr="0">
+        <a:bodyPr spcFirstLastPara="0" vert="horz" wrap="square" lIns="220980" tIns="110490" rIns="220980" bIns="110490" numCol="1" spcCol="1270" anchor="ctr" anchorCtr="0">
           <a:noAutofit/>
         </a:bodyPr>
         <a:lstStyle/>
         <a:p>
-          <a:pPr marL="0" lvl="0" indent="0" algn="ctr" defTabSz="2889250">
+          <a:pPr marL="0" lvl="0" indent="0" algn="ctr" defTabSz="2578100">
             <a:lnSpc>
               <a:spcPct val="90000"/>
             </a:lnSpc>
@@ -1931,17 +1931,17 @@
             <a:buNone/>
           </a:pPr>
           <a:r>
-            <a:rPr lang="en-GB" sz="6500" kern="1200" dirty="0">
+            <a:rPr lang="en-GB" sz="5800" kern="1200" dirty="0">
               <a:latin typeface="Source Serif Pro" panose="02040603050405020204" pitchFamily="18" charset="0"/>
               <a:ea typeface="Source Serif Pro" panose="02040603050405020204" pitchFamily="18" charset="0"/>
             </a:rPr>
-            <a:t>Climb the Leader board</a:t>
+            <a:t>Climb the Leaderboard</a:t>
           </a:r>
         </a:p>
       </dsp:txBody>
       <dsp:txXfrm>
-        <a:off x="164270" y="7238636"/>
-        <a:ext cx="6682093" cy="3036540"/>
+        <a:off x="135064" y="5951665"/>
+        <a:ext cx="4913872" cy="2496668"/>
       </dsp:txXfrm>
     </dsp:sp>
     <dsp:sp modelId="{659AC0E4-7D27-475B-91AB-0B73A3D5A50B}">
@@ -1951,8 +1951,8 @@
       </dsp:nvSpPr>
       <dsp:spPr>
         <a:xfrm rot="5400000">
-          <a:off x="11896276" y="6058567"/>
-          <a:ext cx="2692064" cy="12463349"/>
+          <a:off x="8685281" y="5497136"/>
+          <a:ext cx="2213437" cy="9216000"/>
         </a:xfrm>
         <a:prstGeom prst="round2SameRect">
           <a:avLst/>
@@ -1978,12 +1978,12 @@
         <a:fontRef idx="minor"/>
       </dsp:style>
       <dsp:txBody>
-        <a:bodyPr spcFirstLastPara="0" vert="horz" wrap="square" lIns="247650" tIns="123825" rIns="247650" bIns="123825" numCol="1" spcCol="1270" anchor="ctr" anchorCtr="0">
+        <a:bodyPr spcFirstLastPara="0" vert="horz" wrap="square" lIns="228600" tIns="114300" rIns="228600" bIns="114300" numCol="1" spcCol="1270" anchor="ctr" anchorCtr="0">
           <a:noAutofit/>
         </a:bodyPr>
         <a:lstStyle/>
         <a:p>
-          <a:pPr marL="285750" lvl="1" indent="-285750" algn="ctr" defTabSz="2889250">
+          <a:pPr marL="285750" lvl="1" indent="-285750" algn="ctr" defTabSz="2667000">
             <a:lnSpc>
               <a:spcPct val="90000"/>
             </a:lnSpc>
@@ -1996,7 +1996,7 @@
             <a:buNone/>
           </a:pPr>
           <a:r>
-            <a:rPr lang="en-GB" sz="6500" kern="1200" dirty="0">
+            <a:rPr lang="en-GB" sz="6000" kern="1200" dirty="0">
               <a:latin typeface="Source Serif Pro ExtraLight" panose="02040203050405020204" pitchFamily="18" charset="0"/>
               <a:ea typeface="Source Serif Pro ExtraLight" panose="02040203050405020204" pitchFamily="18" charset="0"/>
             </a:rPr>
@@ -2005,8 +2005,8 @@
         </a:p>
       </dsp:txBody>
       <dsp:txXfrm rot="-5400000">
-        <a:off x="7010634" y="11075625"/>
-        <a:ext cx="12331933" cy="2429232"/>
+        <a:off x="5184000" y="9106469"/>
+        <a:ext cx="9107949" cy="1997335"/>
       </dsp:txXfrm>
     </dsp:sp>
     <dsp:sp modelId="{19D710BD-BBB9-42C4-91D3-D4D74ABB77B6}">
@@ -2016,8 +2016,8 @@
       </dsp:nvSpPr>
       <dsp:spPr>
         <a:xfrm>
-          <a:off x="0" y="10607701"/>
-          <a:ext cx="7010633" cy="3365080"/>
+          <a:off x="0" y="8721738"/>
+          <a:ext cx="5184000" cy="2766796"/>
         </a:xfrm>
         <a:prstGeom prst="roundRect">
           <a:avLst/>
@@ -2054,12 +2054,12 @@
         </a:fontRef>
       </dsp:style>
       <dsp:txBody>
-        <a:bodyPr spcFirstLastPara="0" vert="horz" wrap="square" lIns="247650" tIns="123825" rIns="247650" bIns="123825" numCol="1" spcCol="1270" anchor="ctr" anchorCtr="0">
+        <a:bodyPr spcFirstLastPara="0" vert="horz" wrap="square" lIns="220980" tIns="110490" rIns="220980" bIns="110490" numCol="1" spcCol="1270" anchor="ctr" anchorCtr="0">
           <a:noAutofit/>
         </a:bodyPr>
         <a:lstStyle/>
         <a:p>
-          <a:pPr marL="0" lvl="0" indent="0" algn="ctr" defTabSz="2889250">
+          <a:pPr marL="0" lvl="0" indent="0" algn="ctr" defTabSz="2578100">
             <a:lnSpc>
               <a:spcPct val="90000"/>
             </a:lnSpc>
@@ -2072,7 +2072,7 @@
             <a:buNone/>
           </a:pPr>
           <a:r>
-            <a:rPr lang="en-GB" sz="6500" kern="1200" dirty="0">
+            <a:rPr lang="en-GB" sz="5800" kern="1200" dirty="0">
               <a:latin typeface="Source Serif Pro" panose="02040603050405020204" pitchFamily="18" charset="0"/>
               <a:ea typeface="Source Serif Pro" panose="02040603050405020204" pitchFamily="18" charset="0"/>
             </a:rPr>
@@ -2081,8 +2081,8 @@
         </a:p>
       </dsp:txBody>
       <dsp:txXfrm>
-        <a:off x="164270" y="10771971"/>
-        <a:ext cx="6682093" cy="3036540"/>
+        <a:off x="135064" y="8856802"/>
+        <a:ext cx="4913872" cy="2496668"/>
       </dsp:txXfrm>
     </dsp:sp>
     <dsp:sp modelId="{515AE589-E4EC-40A3-968D-F03F67C2FFE6}">
@@ -2092,8 +2092,8 @@
       </dsp:nvSpPr>
       <dsp:spPr>
         <a:xfrm rot="5400000">
-          <a:off x="11896276" y="9591902"/>
-          <a:ext cx="2692064" cy="12463349"/>
+          <a:off x="8685281" y="8402273"/>
+          <a:ext cx="2213437" cy="9216000"/>
         </a:xfrm>
         <a:prstGeom prst="round2SameRect">
           <a:avLst/>
@@ -2119,12 +2119,12 @@
         <a:fontRef idx="minor"/>
       </dsp:style>
       <dsp:txBody>
-        <a:bodyPr spcFirstLastPara="0" vert="horz" wrap="square" lIns="247650" tIns="123825" rIns="247650" bIns="123825" numCol="1" spcCol="1270" anchor="ctr" anchorCtr="0">
+        <a:bodyPr spcFirstLastPara="0" vert="horz" wrap="square" lIns="228600" tIns="114300" rIns="228600" bIns="114300" numCol="1" spcCol="1270" anchor="ctr" anchorCtr="0">
           <a:noAutofit/>
         </a:bodyPr>
         <a:lstStyle/>
         <a:p>
-          <a:pPr marL="285750" lvl="1" indent="-285750" algn="ctr" defTabSz="2889250">
+          <a:pPr marL="285750" lvl="1" indent="-285750" algn="ctr" defTabSz="2667000">
             <a:lnSpc>
               <a:spcPct val="90000"/>
             </a:lnSpc>
@@ -2137,17 +2137,17 @@
             <a:buNone/>
           </a:pPr>
           <a:r>
-            <a:rPr lang="en-GB" sz="6500" kern="1200" dirty="0">
+            <a:rPr lang="en-GB" sz="6000" kern="1200" dirty="0">
               <a:latin typeface="Source Serif Pro ExtraLight" panose="02040203050405020204" pitchFamily="18" charset="0"/>
               <a:ea typeface="Source Serif Pro ExtraLight" panose="02040203050405020204" pitchFamily="18" charset="0"/>
             </a:rPr>
-            <a:t>View peoples profile.</a:t>
+            <a:t>View peoples profiles.</a:t>
           </a:r>
         </a:p>
       </dsp:txBody>
       <dsp:txXfrm rot="-5400000">
-        <a:off x="7010634" y="14608960"/>
-        <a:ext cx="12331933" cy="2429232"/>
+        <a:off x="5184000" y="12011606"/>
+        <a:ext cx="9107949" cy="1997335"/>
       </dsp:txXfrm>
     </dsp:sp>
     <dsp:sp modelId="{F9F0DF7C-F605-4231-B5B3-F36A373F5E49}">
@@ -2157,8 +2157,8 @@
       </dsp:nvSpPr>
       <dsp:spPr>
         <a:xfrm>
-          <a:off x="0" y="14148733"/>
-          <a:ext cx="7010633" cy="3365080"/>
+          <a:off x="0" y="11633203"/>
+          <a:ext cx="5184000" cy="2766796"/>
         </a:xfrm>
         <a:prstGeom prst="roundRect">
           <a:avLst/>
@@ -2195,12 +2195,12 @@
         </a:fontRef>
       </dsp:style>
       <dsp:txBody>
-        <a:bodyPr spcFirstLastPara="0" vert="horz" wrap="square" lIns="247650" tIns="123825" rIns="247650" bIns="123825" numCol="1" spcCol="1270" anchor="ctr" anchorCtr="0">
+        <a:bodyPr spcFirstLastPara="0" vert="horz" wrap="square" lIns="220980" tIns="110490" rIns="220980" bIns="110490" numCol="1" spcCol="1270" anchor="ctr" anchorCtr="0">
           <a:noAutofit/>
         </a:bodyPr>
         <a:lstStyle/>
         <a:p>
-          <a:pPr marL="0" lvl="0" indent="0" algn="ctr" defTabSz="2889250">
+          <a:pPr marL="0" lvl="0" indent="0" algn="ctr" defTabSz="2578100">
             <a:lnSpc>
               <a:spcPct val="90000"/>
             </a:lnSpc>
@@ -2213,7 +2213,7 @@
             <a:buNone/>
           </a:pPr>
           <a:r>
-            <a:rPr lang="en-GB" sz="6500" kern="1200" dirty="0">
+            <a:rPr lang="en-GB" sz="5800" kern="1200" dirty="0">
               <a:latin typeface="Source Serif Pro" panose="02040603050405020204" pitchFamily="18" charset="0"/>
               <a:ea typeface="Source Serif Pro" panose="02040603050405020204" pitchFamily="18" charset="0"/>
             </a:rPr>
@@ -2222,8 +2222,8 @@
         </a:p>
       </dsp:txBody>
       <dsp:txXfrm>
-        <a:off x="164270" y="14313003"/>
-        <a:ext cx="6682093" cy="3036540"/>
+        <a:off x="135064" y="11768267"/>
+        <a:ext cx="4913872" cy="2496668"/>
       </dsp:txXfrm>
     </dsp:sp>
   </dsp:spTree>
@@ -6832,8 +6832,8 @@
         </p:blipFill>
         <p:spPr>
           <a:xfrm>
-            <a:off x="37554954" y="16418676"/>
-            <a:ext cx="14400000" cy="14400000"/>
+            <a:off x="40983954" y="19390476"/>
+            <a:ext cx="10800000" cy="10800000"/>
           </a:xfrm>
           <a:prstGeom prst="rect">
             <a:avLst/>
@@ -6864,12 +6864,12 @@
         </p:spPr>
         <p:txBody>
           <a:bodyPr>
-            <a:normAutofit fontScale="90000"/>
+            <a:normAutofit/>
           </a:bodyPr>
           <a:lstStyle/>
           <a:p>
             <a:r>
-              <a:rPr lang="en-US" dirty="0">
+              <a:rPr lang="en-US" sz="22500" dirty="0">
                 <a:latin typeface="Source Serif Pro" panose="02040603050405020204" pitchFamily="18" charset="0"/>
                 <a:ea typeface="Source Serif Pro" panose="02040603050405020204" pitchFamily="18" charset="0"/>
               </a:rPr>
@@ -6896,106 +6896,103 @@
         </p:nvSpPr>
         <p:spPr>
           <a:xfrm>
-            <a:off x="12172950" y="3170469"/>
+            <a:off x="12172950" y="3703869"/>
             <a:ext cx="26860500" cy="3661617"/>
           </a:xfrm>
         </p:spPr>
         <p:txBody>
           <a:bodyPr>
-            <a:normAutofit fontScale="92500"/>
+            <a:normAutofit/>
           </a:bodyPr>
           <a:lstStyle/>
           <a:p>
             <a:r>
-              <a:rPr lang="en-GB" b="0" i="0" dirty="0">
+              <a:rPr lang="en-GB" sz="8000" b="0" i="0" dirty="0">
                 <a:effectLst/>
                 <a:latin typeface="Source Serif Pro ExtraLight" panose="02040203050405020204" pitchFamily="18" charset="0"/>
                 <a:ea typeface="Source Serif Pro ExtraLight" panose="02040203050405020204" pitchFamily="18" charset="0"/>
               </a:rPr>
-              <a:t>Toby Forbes</a:t>
-            </a:r>
-            <a:r>
-              <a:rPr lang="en-US" dirty="0">
+              <a:t>Toby</a:t>
+            </a:r>
+            <a:r>
+              <a:rPr lang="en-US" sz="8000" dirty="0">
                 <a:latin typeface="Source Serif Pro ExtraLight" panose="02040203050405020204" pitchFamily="18" charset="0"/>
                 <a:ea typeface="Source Serif Pro ExtraLight" panose="02040203050405020204" pitchFamily="18" charset="0"/>
               </a:rPr>
-              <a:t> , </a:t>
-            </a:r>
-            <a:r>
-              <a:rPr lang="en-GB" b="0" i="0" dirty="0">
+              <a:t>, </a:t>
+            </a:r>
+            <a:r>
+              <a:rPr lang="en-GB" sz="8000" b="0" i="0" dirty="0">
                 <a:effectLst/>
                 <a:latin typeface="Source Serif Pro ExtraLight" panose="02040203050405020204" pitchFamily="18" charset="0"/>
                 <a:ea typeface="Source Serif Pro ExtraLight" panose="02040203050405020204" pitchFamily="18" charset="0"/>
               </a:rPr>
-              <a:t>Harry Collins</a:t>
-            </a:r>
-            <a:r>
-              <a:rPr lang="en-US" dirty="0">
+              <a:t>Harry</a:t>
+            </a:r>
+            <a:r>
+              <a:rPr lang="en-US" sz="8000" dirty="0">
                 <a:latin typeface="Source Serif Pro ExtraLight" panose="02040203050405020204" pitchFamily="18" charset="0"/>
                 <a:ea typeface="Source Serif Pro ExtraLight" panose="02040203050405020204" pitchFamily="18" charset="0"/>
               </a:rPr>
               <a:t>, </a:t>
             </a:r>
             <a:r>
-              <a:rPr lang="en-GB" b="0" i="0" dirty="0">
+              <a:rPr lang="en-GB" sz="8000" b="0" i="0" dirty="0">
                 <a:effectLst/>
                 <a:latin typeface="Source Serif Pro ExtraLight" panose="02040203050405020204" pitchFamily="18" charset="0"/>
                 <a:ea typeface="Source Serif Pro ExtraLight" panose="02040203050405020204" pitchFamily="18" charset="0"/>
               </a:rPr>
-              <a:t>Jack Shaw</a:t>
-            </a:r>
-            <a:r>
-              <a:rPr lang="en-US" dirty="0">
+              <a:t>Jack</a:t>
+            </a:r>
+            <a:r>
+              <a:rPr lang="en-US" sz="8000" dirty="0">
                 <a:latin typeface="Source Serif Pro ExtraLight" panose="02040203050405020204" pitchFamily="18" charset="0"/>
                 <a:ea typeface="Source Serif Pro ExtraLight" panose="02040203050405020204" pitchFamily="18" charset="0"/>
               </a:rPr>
               <a:t>, </a:t>
             </a:r>
             <a:r>
-              <a:rPr lang="en-GB" b="0" i="0" dirty="0">
+              <a:rPr lang="en-GB" sz="8000" b="0" i="0" dirty="0">
                 <a:effectLst/>
                 <a:latin typeface="Source Serif Pro ExtraLight" panose="02040203050405020204" pitchFamily="18" charset="0"/>
                 <a:ea typeface="Source Serif Pro ExtraLight" panose="02040203050405020204" pitchFamily="18" charset="0"/>
               </a:rPr>
-              <a:t>Shalan Sharma</a:t>
-            </a:r>
-            <a:r>
-              <a:rPr lang="en-US" dirty="0">
+              <a:t>Shalan</a:t>
+            </a:r>
+            <a:r>
+              <a:rPr lang="en-US" sz="8000" dirty="0">
                 <a:latin typeface="Source Serif Pro ExtraLight" panose="02040203050405020204" pitchFamily="18" charset="0"/>
                 <a:ea typeface="Source Serif Pro ExtraLight" panose="02040203050405020204" pitchFamily="18" charset="0"/>
               </a:rPr>
               <a:t>, </a:t>
             </a:r>
             <a:r>
-              <a:rPr lang="en-GB" b="0" i="0" dirty="0">
+              <a:rPr lang="en-GB" sz="8000" b="0" i="0" dirty="0">
                 <a:effectLst/>
                 <a:latin typeface="Source Serif Pro ExtraLight" panose="02040203050405020204" pitchFamily="18" charset="0"/>
                 <a:ea typeface="Source Serif Pro ExtraLight" panose="02040203050405020204" pitchFamily="18" charset="0"/>
               </a:rPr>
-              <a:t>Jason Gurung</a:t>
-            </a:r>
-            <a:r>
-              <a:rPr lang="en-US" dirty="0">
+              <a:t>Jason </a:t>
+            </a:r>
+            <a:r>
+              <a:rPr lang="en-US" sz="8000" dirty="0">
                 <a:latin typeface="Source Serif Pro ExtraLight" panose="02040203050405020204" pitchFamily="18" charset="0"/>
                 <a:ea typeface="Source Serif Pro ExtraLight" panose="02040203050405020204" pitchFamily="18" charset="0"/>
               </a:rPr>
-              <a:t> and </a:t>
-            </a:r>
-            <a:r>
-              <a:rPr lang="en-GB" b="0" i="0" dirty="0">
+              <a:t>and </a:t>
+            </a:r>
+            <a:r>
+              <a:rPr lang="en-GB" sz="8000" b="0" i="0" dirty="0">
                 <a:effectLst/>
                 <a:latin typeface="Source Serif Pro ExtraLight" panose="02040203050405020204" pitchFamily="18" charset="0"/>
                 <a:ea typeface="Source Serif Pro ExtraLight" panose="02040203050405020204" pitchFamily="18" charset="0"/>
               </a:rPr>
-              <a:t>Artur Kapitanczyk</a:t>
-            </a:r>
-            <a:r>
-              <a:rPr lang="en-US" dirty="0">
-                <a:latin typeface="Source Serif Pro ExtraLight" panose="02040203050405020204" pitchFamily="18" charset="0"/>
-                <a:ea typeface="Source Serif Pro ExtraLight" panose="02040203050405020204" pitchFamily="18" charset="0"/>
-              </a:rPr>
-              <a:t> </a:t>
-            </a:r>
+              <a:t>Artur</a:t>
+            </a:r>
+            <a:endParaRPr lang="en-US" sz="8000" dirty="0">
+              <a:latin typeface="Source Serif Pro ExtraLight" panose="02040203050405020204" pitchFamily="18" charset="0"/>
+              <a:ea typeface="Source Serif Pro ExtraLight" panose="02040203050405020204" pitchFamily="18" charset="0"/>
+            </a:endParaRPr>
           </a:p>
         </p:txBody>
       </p:sp>
@@ -7249,14 +7246,14 @@
           <p:nvPr>
             <p:extLst>
               <p:ext uri="{D42A27DB-BD31-4B8C-83A1-F6EECF244321}">
-                <p14:modId xmlns:p14="http://schemas.microsoft.com/office/powerpoint/2010/main" val="699283887"/>
+                <p14:modId xmlns:p14="http://schemas.microsoft.com/office/powerpoint/2010/main" val="4090142347"/>
               </p:ext>
             </p:extLst>
           </p:nvPr>
         </p:nvGraphicFramePr>
         <p:xfrm>
-          <a:off x="15866207" y="6597187"/>
-          <a:ext cx="19473983" cy="17513814"/>
+          <a:off x="18403198" y="6417953"/>
+          <a:ext cx="14400001" cy="14400000"/>
         </p:xfrm>
         <a:graphic>
           <a:graphicData uri="http://schemas.openxmlformats.org/drawingml/2006/diagram">

</xml_diff>